<commit_message>
Update pictures and ppt
</commit_message>
<xml_diff>
--- a/PPT/云计算 Streaming 实现汇报.pptx
+++ b/PPT/云计算 Streaming 实现汇报.pptx
@@ -26,10 +26,10 @@
     <p:sldId id="364" r:id="rId17"/>
     <p:sldId id="350" r:id="rId18"/>
     <p:sldId id="360" r:id="rId19"/>
-    <p:sldId id="351" r:id="rId20"/>
-    <p:sldId id="362" r:id="rId21"/>
-    <p:sldId id="361" r:id="rId22"/>
-    <p:sldId id="363" r:id="rId23"/>
+    <p:sldId id="361" r:id="rId20"/>
+    <p:sldId id="363" r:id="rId21"/>
+    <p:sldId id="351" r:id="rId22"/>
+    <p:sldId id="362" r:id="rId23"/>
     <p:sldId id="342" r:id="rId24"/>
     <p:sldId id="343" r:id="rId25"/>
     <p:sldId id="344" r:id="rId26"/>
@@ -5242,7 +5242,7 @@
     </p:spTree>
     <p:extLst>
       <p:ext uri="{BB962C8B-B14F-4D97-AF65-F5344CB8AC3E}">
-        <p14:creationId xmlns:p14="http://schemas.microsoft.com/office/powerpoint/2010/main" val="972502216"/>
+        <p14:creationId xmlns:p14="http://schemas.microsoft.com/office/powerpoint/2010/main" val="682494559"/>
       </p:ext>
     </p:extLst>
   </p:cSld>
@@ -5432,7 +5432,7 @@
     </p:spTree>
     <p:extLst>
       <p:ext uri="{BB962C8B-B14F-4D97-AF65-F5344CB8AC3E}">
-        <p14:creationId xmlns:p14="http://schemas.microsoft.com/office/powerpoint/2010/main" val="2027274289"/>
+        <p14:creationId xmlns:p14="http://schemas.microsoft.com/office/powerpoint/2010/main" val="1415296903"/>
       </p:ext>
     </p:extLst>
   </p:cSld>
@@ -5538,7 +5538,7 @@
     </p:spTree>
     <p:extLst>
       <p:ext uri="{BB962C8B-B14F-4D97-AF65-F5344CB8AC3E}">
-        <p14:creationId xmlns:p14="http://schemas.microsoft.com/office/powerpoint/2010/main" val="682494559"/>
+        <p14:creationId xmlns:p14="http://schemas.microsoft.com/office/powerpoint/2010/main" val="972502216"/>
       </p:ext>
     </p:extLst>
   </p:cSld>
@@ -5644,7 +5644,7 @@
     </p:spTree>
     <p:extLst>
       <p:ext uri="{BB962C8B-B14F-4D97-AF65-F5344CB8AC3E}">
-        <p14:creationId xmlns:p14="http://schemas.microsoft.com/office/powerpoint/2010/main" val="1415296903"/>
+        <p14:creationId xmlns:p14="http://schemas.microsoft.com/office/powerpoint/2010/main" val="2027274289"/>
       </p:ext>
     </p:extLst>
   </p:cSld>
@@ -13007,7 +13007,7 @@
             </a:r>
             <a:r>
               <a:rPr lang="zh-CN" altLang="en-US" dirty="0"/>
-              <a:t>流计算</a:t>
+              <a:t>数据转换</a:t>
             </a:r>
           </a:p>
         </p:txBody>
@@ -13133,7 +13133,7 @@
             </a:r>
             <a:r>
               <a:rPr lang="zh-CN" altLang="en-US" dirty="0"/>
-              <a:t>流计算</a:t>
+              <a:t>数据转换</a:t>
             </a:r>
           </a:p>
         </p:txBody>
@@ -13872,12 +13872,8 @@
               <a:t>IV.</a:t>
             </a:r>
             <a:r>
-              <a:rPr lang="zh-CN" altLang="en-US"/>
-              <a:t> 流计算</a:t>
-            </a:r>
-            <a:r>
               <a:rPr lang="zh-CN" altLang="en-US" dirty="0"/>
-              <a:t>步骤</a:t>
+              <a:t> 流计算步骤</a:t>
             </a:r>
             <a:r>
               <a:rPr lang="en-US" altLang="zh-CN" dirty="0"/>
@@ -13885,7 +13881,7 @@
             </a:r>
             <a:r>
               <a:rPr lang="zh-CN" altLang="en-US" dirty="0"/>
-              <a:t>问题和解决方案</a:t>
+              <a:t>一键启动</a:t>
             </a:r>
           </a:p>
         </p:txBody>
@@ -13919,23 +13915,7 @@
                   <a:prstClr val="black"/>
                 </a:solidFill>
               </a:rPr>
-              <a:t>因为数据</a:t>
-            </a:r>
-            <a:r>
-              <a:rPr lang="en-US" altLang="zh-CN" dirty="0">
-                <a:solidFill>
-                  <a:prstClr val="black"/>
-                </a:solidFill>
-              </a:rPr>
-              <a:t>explode</a:t>
-            </a:r>
-            <a:r>
-              <a:rPr lang="zh-CN" altLang="en-US" dirty="0">
-                <a:solidFill>
-                  <a:prstClr val="black"/>
-                </a:solidFill>
-              </a:rPr>
-              <a:t>导致大量数据库操作：</a:t>
+              <a:t>流的一键启动</a:t>
             </a:r>
             <a:endParaRPr lang="en-US" altLang="zh-CN" dirty="0">
               <a:solidFill>
@@ -13963,6 +13943,602 @@
             <a:fld id="{02AE1E35-F495-4665-8CB0-CDD28443F6EA}" type="slidenum">
               <a:rPr lang="zh-CN" altLang="en-US" smtClean="0"/>
               <a:t>19</a:t>
+            </a:fld>
+            <a:endParaRPr lang="zh-CN" altLang="en-US"/>
+          </a:p>
+        </p:txBody>
+      </p:sp>
+      <p:pic>
+        <p:nvPicPr>
+          <p:cNvPr id="4" name="图片 3">
+            <a:extLst>
+              <a:ext uri="{FF2B5EF4-FFF2-40B4-BE49-F238E27FC236}">
+                <a16:creationId xmlns:a16="http://schemas.microsoft.com/office/drawing/2014/main" id="{B0664363-B11F-4A42-A659-6F9640C09D73}"/>
+              </a:ext>
+            </a:extLst>
+          </p:cNvPr>
+          <p:cNvPicPr>
+            <a:picLocks noChangeAspect="1"/>
+          </p:cNvPicPr>
+          <p:nvPr/>
+        </p:nvPicPr>
+        <p:blipFill>
+          <a:blip r:embed="rId3"/>
+          <a:stretch>
+            <a:fillRect/>
+          </a:stretch>
+        </p:blipFill>
+        <p:spPr>
+          <a:xfrm>
+            <a:off x="899175" y="1964753"/>
+            <a:ext cx="7613040" cy="3543607"/>
+          </a:xfrm>
+          <a:prstGeom prst="rect">
+            <a:avLst/>
+          </a:prstGeom>
+        </p:spPr>
+      </p:pic>
+    </p:spTree>
+    <p:extLst>
+      <p:ext uri="{BB962C8B-B14F-4D97-AF65-F5344CB8AC3E}">
+        <p14:creationId xmlns:p14="http://schemas.microsoft.com/office/powerpoint/2010/main" val="4154761658"/>
+      </p:ext>
+    </p:extLst>
+  </p:cSld>
+  <p:clrMapOvr>
+    <a:masterClrMapping/>
+  </p:clrMapOvr>
+</p:sld>
+</file>
+
+<file path=ppt/slides/slide2.xml><?xml version="1.0" encoding="utf-8"?>
+<p:sld xmlns:a="http://schemas.openxmlformats.org/drawingml/2006/main" xmlns:r="http://schemas.openxmlformats.org/officeDocument/2006/relationships" xmlns:p="http://schemas.openxmlformats.org/presentationml/2006/main">
+  <p:cSld>
+    <p:spTree>
+      <p:nvGrpSpPr>
+        <p:cNvPr id="1" name=""/>
+        <p:cNvGrpSpPr/>
+        <p:nvPr/>
+      </p:nvGrpSpPr>
+      <p:grpSpPr>
+        <a:xfrm>
+          <a:off x="0" y="0"/>
+          <a:ext cx="0" cy="0"/>
+          <a:chOff x="0" y="0"/>
+          <a:chExt cx="0" cy="0"/>
+        </a:xfrm>
+      </p:grpSpPr>
+      <p:sp>
+        <p:nvSpPr>
+          <p:cNvPr id="2" name="标题 1"/>
+          <p:cNvSpPr>
+            <a:spLocks noGrp="1"/>
+          </p:cNvSpPr>
+          <p:nvPr>
+            <p:ph type="title"/>
+          </p:nvPr>
+        </p:nvSpPr>
+        <p:spPr>
+          <a:xfrm>
+            <a:off x="1804755" y="1162050"/>
+            <a:ext cx="1059095" cy="1947894"/>
+          </a:xfrm>
+          <a:solidFill>
+            <a:srgbClr val="6F0E6F"/>
+          </a:solidFill>
+        </p:spPr>
+        <p:txBody>
+          <a:bodyPr>
+            <a:normAutofit/>
+          </a:bodyPr>
+          <a:lstStyle/>
+          <a:p>
+            <a:r>
+              <a:rPr lang="zh-CN" altLang="en-US" sz="3200" dirty="0">
+                <a:solidFill>
+                  <a:schemeClr val="bg1"/>
+                </a:solidFill>
+              </a:rPr>
+              <a:t>目</a:t>
+            </a:r>
+            <a:br>
+              <a:rPr lang="en-US" altLang="zh-CN" sz="3200" dirty="0">
+                <a:solidFill>
+                  <a:schemeClr val="bg1"/>
+                </a:solidFill>
+              </a:rPr>
+            </a:br>
+            <a:r>
+              <a:rPr lang="zh-CN" altLang="en-US" sz="3200" dirty="0">
+                <a:solidFill>
+                  <a:schemeClr val="bg1"/>
+                </a:solidFill>
+              </a:rPr>
+              <a:t>录</a:t>
+            </a:r>
+          </a:p>
+        </p:txBody>
+      </p:sp>
+      <p:sp>
+        <p:nvSpPr>
+          <p:cNvPr id="3" name="内容占位符 2"/>
+          <p:cNvSpPr>
+            <a:spLocks noGrp="1"/>
+          </p:cNvSpPr>
+          <p:nvPr>
+            <p:ph idx="1"/>
+          </p:nvPr>
+        </p:nvSpPr>
+        <p:spPr>
+          <a:xfrm>
+            <a:off x="4222750" y="1308100"/>
+            <a:ext cx="3907748" cy="5302250"/>
+          </a:xfrm>
+        </p:spPr>
+        <p:txBody>
+          <a:bodyPr>
+            <a:normAutofit/>
+          </a:bodyPr>
+          <a:lstStyle/>
+          <a:p>
+            <a:r>
+              <a:rPr lang="en-US" altLang="zh-CN" b="1" dirty="0"/>
+              <a:t>Streaming </a:t>
+            </a:r>
+            <a:r>
+              <a:rPr lang="zh-CN" altLang="en-US" b="1" dirty="0"/>
+              <a:t>作业实现</a:t>
+            </a:r>
+            <a:endParaRPr lang="en-US" altLang="zh-CN" b="1" dirty="0"/>
+          </a:p>
+          <a:p>
+            <a:pPr lvl="1"/>
+            <a:r>
+              <a:rPr lang="en-US" altLang="zh-CN" b="1" dirty="0"/>
+              <a:t>I.</a:t>
+            </a:r>
+            <a:r>
+              <a:rPr lang="zh-CN" altLang="en-US" b="1" dirty="0"/>
+              <a:t> 需求分析</a:t>
+            </a:r>
+            <a:endParaRPr lang="en-US" altLang="zh-CN" b="1" dirty="0"/>
+          </a:p>
+          <a:p>
+            <a:pPr lvl="1"/>
+            <a:r>
+              <a:rPr lang="en-US" altLang="zh-CN" b="1" dirty="0"/>
+              <a:t>II.</a:t>
+            </a:r>
+            <a:r>
+              <a:rPr lang="zh-CN" altLang="en-US" b="1" dirty="0"/>
+              <a:t> 整体架构</a:t>
+            </a:r>
+            <a:endParaRPr lang="en-CN" altLang="zh-CN" b="1" dirty="0"/>
+          </a:p>
+          <a:p>
+            <a:pPr lvl="1"/>
+            <a:r>
+              <a:rPr lang="en-US" altLang="zh-CN" b="1" dirty="0"/>
+              <a:t>III.</a:t>
+            </a:r>
+            <a:r>
+              <a:rPr lang="zh-CN" altLang="en-US" b="1" dirty="0"/>
+              <a:t> 数据</a:t>
+            </a:r>
+            <a:r>
+              <a:rPr lang="zh-CN" altLang="en-CN" b="1" dirty="0"/>
+              <a:t>获取</a:t>
+            </a:r>
+            <a:endParaRPr lang="en-US" altLang="zh-CN" b="1" dirty="0"/>
+          </a:p>
+          <a:p>
+            <a:pPr lvl="1"/>
+            <a:r>
+              <a:rPr lang="en-US" altLang="zh-CN" b="1" dirty="0"/>
+              <a:t>IV.</a:t>
+            </a:r>
+            <a:r>
+              <a:rPr lang="zh-CN" altLang="en-US" b="1" dirty="0"/>
+              <a:t> 流计算步骤</a:t>
+            </a:r>
+            <a:endParaRPr lang="en-US" altLang="zh-CN" b="1" dirty="0"/>
+          </a:p>
+          <a:p>
+            <a:pPr lvl="1"/>
+            <a:r>
+              <a:rPr lang="en-US" altLang="zh-CN" b="1" dirty="0"/>
+              <a:t>V.</a:t>
+            </a:r>
+            <a:r>
+              <a:rPr lang="zh-CN" altLang="en-US" b="1" dirty="0"/>
+              <a:t> 项目展示</a:t>
+            </a:r>
+            <a:endParaRPr lang="en-US" altLang="zh-CN" b="1" dirty="0"/>
+          </a:p>
+        </p:txBody>
+      </p:sp>
+      <p:sp>
+        <p:nvSpPr>
+          <p:cNvPr id="4" name="标题 1"/>
+          <p:cNvSpPr txBox="1">
+            <a:spLocks/>
+          </p:cNvSpPr>
+          <p:nvPr/>
+        </p:nvSpPr>
+        <p:spPr>
+          <a:xfrm>
+            <a:off x="4222750" y="1162050"/>
+            <a:ext cx="3907748" cy="146050"/>
+          </a:xfrm>
+          <a:prstGeom prst="rect">
+            <a:avLst/>
+          </a:prstGeom>
+          <a:solidFill>
+            <a:srgbClr val="6F0E6F"/>
+          </a:solidFill>
+        </p:spPr>
+        <p:txBody>
+          <a:bodyPr vert="horz" lIns="91440" tIns="45720" rIns="91440" bIns="45720" rtlCol="0" anchor="ctr">
+            <a:normAutofit fontScale="25000" lnSpcReduction="20000"/>
+          </a:bodyPr>
+          <a:lstStyle>
+            <a:lvl1pPr algn="ctr" defTabSz="685800" rtl="0" eaLnBrk="1" latinLnBrk="0" hangingPunct="1">
+              <a:lnSpc>
+                <a:spcPct val="90000"/>
+              </a:lnSpc>
+              <a:spcBef>
+                <a:spcPct val="0"/>
+              </a:spcBef>
+              <a:buNone/>
+              <a:defRPr sz="2700" b="1" kern="1200">
+                <a:solidFill>
+                  <a:srgbClr val="6F0E6F"/>
+                </a:solidFill>
+                <a:latin typeface="微软雅黑" panose="020B0503020204020204" pitchFamily="34" charset="-122"/>
+                <a:ea typeface="微软雅黑" panose="020B0503020204020204" pitchFamily="34" charset="-122"/>
+                <a:cs typeface="+mj-cs"/>
+              </a:defRPr>
+            </a:lvl1pPr>
+          </a:lstStyle>
+          <a:p>
+            <a:endParaRPr lang="zh-CN" altLang="en-US" sz="3200" dirty="0">
+              <a:solidFill>
+                <a:schemeClr val="bg1"/>
+              </a:solidFill>
+            </a:endParaRPr>
+          </a:p>
+        </p:txBody>
+      </p:sp>
+      <p:sp>
+        <p:nvSpPr>
+          <p:cNvPr id="5" name="灯片编号占位符 4"/>
+          <p:cNvSpPr>
+            <a:spLocks noGrp="1"/>
+          </p:cNvSpPr>
+          <p:nvPr>
+            <p:ph type="sldNum" sz="quarter" idx="12"/>
+          </p:nvPr>
+        </p:nvSpPr>
+        <p:spPr/>
+        <p:txBody>
+          <a:bodyPr/>
+          <a:lstStyle/>
+          <a:p>
+            <a:fld id="{02AE1E35-F495-4665-8CB0-CDD28443F6EA}" type="slidenum">
+              <a:rPr lang="zh-CN" altLang="en-US" smtClean="0"/>
+              <a:t>2</a:t>
+            </a:fld>
+            <a:endParaRPr lang="zh-CN" altLang="en-US"/>
+          </a:p>
+        </p:txBody>
+      </p:sp>
+    </p:spTree>
+    <p:extLst>
+      <p:ext uri="{BB962C8B-B14F-4D97-AF65-F5344CB8AC3E}">
+        <p14:creationId xmlns:p14="http://schemas.microsoft.com/office/powerpoint/2010/main" val="2385772990"/>
+      </p:ext>
+    </p:extLst>
+  </p:cSld>
+  <p:clrMapOvr>
+    <a:masterClrMapping/>
+  </p:clrMapOvr>
+</p:sld>
+</file>
+
+<file path=ppt/slides/slide20.xml><?xml version="1.0" encoding="utf-8"?>
+<p:sld xmlns:a="http://schemas.openxmlformats.org/drawingml/2006/main" xmlns:r="http://schemas.openxmlformats.org/officeDocument/2006/relationships" xmlns:p="http://schemas.openxmlformats.org/presentationml/2006/main">
+  <p:cSld>
+    <p:spTree>
+      <p:nvGrpSpPr>
+        <p:cNvPr id="1" name=""/>
+        <p:cNvGrpSpPr/>
+        <p:nvPr/>
+      </p:nvGrpSpPr>
+      <p:grpSpPr>
+        <a:xfrm>
+          <a:off x="0" y="0"/>
+          <a:ext cx="0" cy="0"/>
+          <a:chOff x="0" y="0"/>
+          <a:chExt cx="0" cy="0"/>
+        </a:xfrm>
+      </p:grpSpPr>
+      <p:sp>
+        <p:nvSpPr>
+          <p:cNvPr id="2" name="标题 1"/>
+          <p:cNvSpPr>
+            <a:spLocks noGrp="1"/>
+          </p:cNvSpPr>
+          <p:nvPr>
+            <p:ph type="title"/>
+          </p:nvPr>
+        </p:nvSpPr>
+        <p:spPr>
+          <a:xfrm>
+            <a:off x="420454" y="287306"/>
+            <a:ext cx="8301515" cy="649110"/>
+          </a:xfrm>
+        </p:spPr>
+        <p:txBody>
+          <a:bodyPr/>
+          <a:lstStyle/>
+          <a:p>
+            <a:r>
+              <a:rPr lang="en-US" altLang="zh-CN" dirty="0"/>
+              <a:t>IV.</a:t>
+            </a:r>
+            <a:r>
+              <a:rPr lang="zh-CN" altLang="en-US" dirty="0"/>
+              <a:t> 流计算步骤</a:t>
+            </a:r>
+            <a:r>
+              <a:rPr lang="en-US" altLang="zh-CN" dirty="0"/>
+              <a:t>——</a:t>
+            </a:r>
+            <a:r>
+              <a:rPr lang="zh-CN" altLang="en-US" dirty="0"/>
+              <a:t>一键启动</a:t>
+            </a:r>
+          </a:p>
+        </p:txBody>
+      </p:sp>
+      <p:sp>
+        <p:nvSpPr>
+          <p:cNvPr id="3" name="内容占位符 2"/>
+          <p:cNvSpPr>
+            <a:spLocks noGrp="1"/>
+          </p:cNvSpPr>
+          <p:nvPr>
+            <p:ph idx="1"/>
+          </p:nvPr>
+        </p:nvSpPr>
+        <p:spPr>
+          <a:xfrm>
+            <a:off x="420456" y="1188138"/>
+            <a:ext cx="8570478" cy="5096838"/>
+          </a:xfrm>
+        </p:spPr>
+        <p:txBody>
+          <a:bodyPr>
+            <a:normAutofit/>
+          </a:bodyPr>
+          <a:lstStyle/>
+          <a:p>
+            <a:pPr lvl="0"/>
+            <a:r>
+              <a:rPr lang="zh-CN" altLang="en-US" dirty="0">
+                <a:solidFill>
+                  <a:prstClr val="black"/>
+                </a:solidFill>
+              </a:rPr>
+              <a:t>流的一键启动</a:t>
+            </a:r>
+            <a:endParaRPr lang="en-US" altLang="zh-CN" dirty="0">
+              <a:solidFill>
+                <a:prstClr val="black"/>
+              </a:solidFill>
+            </a:endParaRPr>
+          </a:p>
+        </p:txBody>
+      </p:sp>
+      <p:sp>
+        <p:nvSpPr>
+          <p:cNvPr id="5" name="灯片编号占位符 4"/>
+          <p:cNvSpPr>
+            <a:spLocks noGrp="1"/>
+          </p:cNvSpPr>
+          <p:nvPr>
+            <p:ph type="sldNum" sz="quarter" idx="12"/>
+          </p:nvPr>
+        </p:nvSpPr>
+        <p:spPr/>
+        <p:txBody>
+          <a:bodyPr/>
+          <a:lstStyle/>
+          <a:p>
+            <a:fld id="{02AE1E35-F495-4665-8CB0-CDD28443F6EA}" type="slidenum">
+              <a:rPr lang="zh-CN" altLang="en-US" smtClean="0"/>
+              <a:t>20</a:t>
+            </a:fld>
+            <a:endParaRPr lang="zh-CN" altLang="en-US"/>
+          </a:p>
+        </p:txBody>
+      </p:sp>
+      <p:pic>
+        <p:nvPicPr>
+          <p:cNvPr id="6" name="图片 5">
+            <a:extLst>
+              <a:ext uri="{FF2B5EF4-FFF2-40B4-BE49-F238E27FC236}">
+                <a16:creationId xmlns:a16="http://schemas.microsoft.com/office/drawing/2014/main" id="{5803D64A-2679-4406-BEF1-E259E3E019E3}"/>
+              </a:ext>
+            </a:extLst>
+          </p:cNvPr>
+          <p:cNvPicPr>
+            <a:picLocks noChangeAspect="1"/>
+          </p:cNvPicPr>
+          <p:nvPr/>
+        </p:nvPicPr>
+        <p:blipFill>
+          <a:blip r:embed="rId3"/>
+          <a:stretch>
+            <a:fillRect/>
+          </a:stretch>
+        </p:blipFill>
+        <p:spPr>
+          <a:xfrm>
+            <a:off x="959976" y="2132408"/>
+            <a:ext cx="7658764" cy="3208298"/>
+          </a:xfrm>
+          <a:prstGeom prst="rect">
+            <a:avLst/>
+          </a:prstGeom>
+        </p:spPr>
+      </p:pic>
+    </p:spTree>
+    <p:extLst>
+      <p:ext uri="{BB962C8B-B14F-4D97-AF65-F5344CB8AC3E}">
+        <p14:creationId xmlns:p14="http://schemas.microsoft.com/office/powerpoint/2010/main" val="1157749109"/>
+      </p:ext>
+    </p:extLst>
+  </p:cSld>
+  <p:clrMapOvr>
+    <a:masterClrMapping/>
+  </p:clrMapOvr>
+</p:sld>
+</file>
+
+<file path=ppt/slides/slide21.xml><?xml version="1.0" encoding="utf-8"?>
+<p:sld xmlns:a="http://schemas.openxmlformats.org/drawingml/2006/main" xmlns:r="http://schemas.openxmlformats.org/officeDocument/2006/relationships" xmlns:p="http://schemas.openxmlformats.org/presentationml/2006/main">
+  <p:cSld>
+    <p:spTree>
+      <p:nvGrpSpPr>
+        <p:cNvPr id="1" name=""/>
+        <p:cNvGrpSpPr/>
+        <p:nvPr/>
+      </p:nvGrpSpPr>
+      <p:grpSpPr>
+        <a:xfrm>
+          <a:off x="0" y="0"/>
+          <a:ext cx="0" cy="0"/>
+          <a:chOff x="0" y="0"/>
+          <a:chExt cx="0" cy="0"/>
+        </a:xfrm>
+      </p:grpSpPr>
+      <p:sp>
+        <p:nvSpPr>
+          <p:cNvPr id="2" name="标题 1"/>
+          <p:cNvSpPr>
+            <a:spLocks noGrp="1"/>
+          </p:cNvSpPr>
+          <p:nvPr>
+            <p:ph type="title"/>
+          </p:nvPr>
+        </p:nvSpPr>
+        <p:spPr>
+          <a:xfrm>
+            <a:off x="420454" y="287306"/>
+            <a:ext cx="8301515" cy="649110"/>
+          </a:xfrm>
+        </p:spPr>
+        <p:txBody>
+          <a:bodyPr/>
+          <a:lstStyle/>
+          <a:p>
+            <a:r>
+              <a:rPr lang="en-US" altLang="zh-CN" dirty="0"/>
+              <a:t>IV.</a:t>
+            </a:r>
+            <a:r>
+              <a:rPr lang="zh-CN" altLang="en-US"/>
+              <a:t> 流计算</a:t>
+            </a:r>
+            <a:r>
+              <a:rPr lang="zh-CN" altLang="en-US" dirty="0"/>
+              <a:t>步骤</a:t>
+            </a:r>
+            <a:r>
+              <a:rPr lang="en-US" altLang="zh-CN" dirty="0"/>
+              <a:t>——</a:t>
+            </a:r>
+            <a:r>
+              <a:rPr lang="zh-CN" altLang="en-US" dirty="0"/>
+              <a:t>问题和解决方案</a:t>
+            </a:r>
+          </a:p>
+        </p:txBody>
+      </p:sp>
+      <p:sp>
+        <p:nvSpPr>
+          <p:cNvPr id="3" name="内容占位符 2"/>
+          <p:cNvSpPr>
+            <a:spLocks noGrp="1"/>
+          </p:cNvSpPr>
+          <p:nvPr>
+            <p:ph idx="1"/>
+          </p:nvPr>
+        </p:nvSpPr>
+        <p:spPr>
+          <a:xfrm>
+            <a:off x="420456" y="1188138"/>
+            <a:ext cx="8570478" cy="5096838"/>
+          </a:xfrm>
+        </p:spPr>
+        <p:txBody>
+          <a:bodyPr>
+            <a:normAutofit/>
+          </a:bodyPr>
+          <a:lstStyle/>
+          <a:p>
+            <a:pPr lvl="0"/>
+            <a:r>
+              <a:rPr lang="zh-CN" altLang="en-US" dirty="0">
+                <a:solidFill>
+                  <a:prstClr val="black"/>
+                </a:solidFill>
+              </a:rPr>
+              <a:t>因为数据</a:t>
+            </a:r>
+            <a:r>
+              <a:rPr lang="en-US" altLang="zh-CN" dirty="0">
+                <a:solidFill>
+                  <a:prstClr val="black"/>
+                </a:solidFill>
+              </a:rPr>
+              <a:t>explode</a:t>
+            </a:r>
+            <a:r>
+              <a:rPr lang="zh-CN" altLang="en-US" dirty="0">
+                <a:solidFill>
+                  <a:prstClr val="black"/>
+                </a:solidFill>
+              </a:rPr>
+              <a:t>导致大量数据库操作：</a:t>
+            </a:r>
+            <a:endParaRPr lang="en-US" altLang="zh-CN" dirty="0">
+              <a:solidFill>
+                <a:prstClr val="black"/>
+              </a:solidFill>
+            </a:endParaRPr>
+          </a:p>
+        </p:txBody>
+      </p:sp>
+      <p:sp>
+        <p:nvSpPr>
+          <p:cNvPr id="5" name="灯片编号占位符 4"/>
+          <p:cNvSpPr>
+            <a:spLocks noGrp="1"/>
+          </p:cNvSpPr>
+          <p:nvPr>
+            <p:ph type="sldNum" sz="quarter" idx="12"/>
+          </p:nvPr>
+        </p:nvSpPr>
+        <p:spPr/>
+        <p:txBody>
+          <a:bodyPr/>
+          <a:lstStyle/>
+          <a:p>
+            <a:fld id="{02AE1E35-F495-4665-8CB0-CDD28443F6EA}" type="slidenum">
+              <a:rPr lang="zh-CN" altLang="en-US" smtClean="0"/>
+              <a:t>21</a:t>
             </a:fld>
             <a:endParaRPr lang="zh-CN" altLang="en-US"/>
           </a:p>
@@ -14011,7 +14587,7 @@
 </p:sld>
 </file>
 
-<file path=ppt/slides/slide2.xml><?xml version="1.0" encoding="utf-8"?>
+<file path=ppt/slides/slide22.xml><?xml version="1.0" encoding="utf-8"?>
 <p:sld xmlns:a="http://schemas.openxmlformats.org/drawingml/2006/main" xmlns:r="http://schemas.openxmlformats.org/officeDocument/2006/relationships" xmlns:p="http://schemas.openxmlformats.org/presentationml/2006/main">
   <p:cSld>
     <p:spTree>
@@ -14040,260 +14616,6 @@
         </p:nvSpPr>
         <p:spPr>
           <a:xfrm>
-            <a:off x="1804755" y="1162050"/>
-            <a:ext cx="1059095" cy="1947894"/>
-          </a:xfrm>
-          <a:solidFill>
-            <a:srgbClr val="6F0E6F"/>
-          </a:solidFill>
-        </p:spPr>
-        <p:txBody>
-          <a:bodyPr>
-            <a:normAutofit/>
-          </a:bodyPr>
-          <a:lstStyle/>
-          <a:p>
-            <a:r>
-              <a:rPr lang="zh-CN" altLang="en-US" sz="3200" dirty="0">
-                <a:solidFill>
-                  <a:schemeClr val="bg1"/>
-                </a:solidFill>
-              </a:rPr>
-              <a:t>目</a:t>
-            </a:r>
-            <a:br>
-              <a:rPr lang="en-US" altLang="zh-CN" sz="3200" dirty="0">
-                <a:solidFill>
-                  <a:schemeClr val="bg1"/>
-                </a:solidFill>
-              </a:rPr>
-            </a:br>
-            <a:r>
-              <a:rPr lang="zh-CN" altLang="en-US" sz="3200" dirty="0">
-                <a:solidFill>
-                  <a:schemeClr val="bg1"/>
-                </a:solidFill>
-              </a:rPr>
-              <a:t>录</a:t>
-            </a:r>
-          </a:p>
-        </p:txBody>
-      </p:sp>
-      <p:sp>
-        <p:nvSpPr>
-          <p:cNvPr id="3" name="内容占位符 2"/>
-          <p:cNvSpPr>
-            <a:spLocks noGrp="1"/>
-          </p:cNvSpPr>
-          <p:nvPr>
-            <p:ph idx="1"/>
-          </p:nvPr>
-        </p:nvSpPr>
-        <p:spPr>
-          <a:xfrm>
-            <a:off x="4222750" y="1308100"/>
-            <a:ext cx="3907748" cy="5302250"/>
-          </a:xfrm>
-        </p:spPr>
-        <p:txBody>
-          <a:bodyPr>
-            <a:normAutofit/>
-          </a:bodyPr>
-          <a:lstStyle/>
-          <a:p>
-            <a:r>
-              <a:rPr lang="en-US" altLang="zh-CN" b="1" dirty="0"/>
-              <a:t>Streaming </a:t>
-            </a:r>
-            <a:r>
-              <a:rPr lang="zh-CN" altLang="en-US" b="1" dirty="0"/>
-              <a:t>作业实现</a:t>
-            </a:r>
-            <a:endParaRPr lang="en-US" altLang="zh-CN" b="1" dirty="0"/>
-          </a:p>
-          <a:p>
-            <a:pPr lvl="1"/>
-            <a:r>
-              <a:rPr lang="en-US" altLang="zh-CN" b="1" dirty="0"/>
-              <a:t>I.</a:t>
-            </a:r>
-            <a:r>
-              <a:rPr lang="zh-CN" altLang="en-US" b="1" dirty="0"/>
-              <a:t> 需求分析</a:t>
-            </a:r>
-            <a:endParaRPr lang="en-US" altLang="zh-CN" b="1" dirty="0"/>
-          </a:p>
-          <a:p>
-            <a:pPr lvl="1"/>
-            <a:r>
-              <a:rPr lang="en-US" altLang="zh-CN" b="1" dirty="0"/>
-              <a:t>II.</a:t>
-            </a:r>
-            <a:r>
-              <a:rPr lang="zh-CN" altLang="en-US" b="1" dirty="0"/>
-              <a:t> 整体架构</a:t>
-            </a:r>
-            <a:endParaRPr lang="en-CN" altLang="zh-CN" b="1" dirty="0"/>
-          </a:p>
-          <a:p>
-            <a:pPr lvl="1"/>
-            <a:r>
-              <a:rPr lang="en-US" altLang="zh-CN" b="1" dirty="0"/>
-              <a:t>III.</a:t>
-            </a:r>
-            <a:r>
-              <a:rPr lang="zh-CN" altLang="en-US" b="1" dirty="0"/>
-              <a:t> 数据</a:t>
-            </a:r>
-            <a:r>
-              <a:rPr lang="zh-CN" altLang="en-CN" b="1" dirty="0"/>
-              <a:t>获取</a:t>
-            </a:r>
-            <a:endParaRPr lang="en-US" altLang="zh-CN" b="1" dirty="0"/>
-          </a:p>
-          <a:p>
-            <a:pPr lvl="1"/>
-            <a:r>
-              <a:rPr lang="en-US" altLang="zh-CN" b="1" dirty="0"/>
-              <a:t>IV.</a:t>
-            </a:r>
-            <a:r>
-              <a:rPr lang="zh-CN" altLang="en-US" b="1" dirty="0"/>
-              <a:t> 流计算步骤</a:t>
-            </a:r>
-            <a:endParaRPr lang="en-US" altLang="zh-CN" b="1" dirty="0"/>
-          </a:p>
-          <a:p>
-            <a:pPr lvl="1"/>
-            <a:r>
-              <a:rPr lang="en-US" altLang="zh-CN" b="1" dirty="0"/>
-              <a:t>V.</a:t>
-            </a:r>
-            <a:r>
-              <a:rPr lang="zh-CN" altLang="en-US" b="1" dirty="0"/>
-              <a:t> 项目展示</a:t>
-            </a:r>
-            <a:endParaRPr lang="en-US" altLang="zh-CN" b="1" dirty="0"/>
-          </a:p>
-        </p:txBody>
-      </p:sp>
-      <p:sp>
-        <p:nvSpPr>
-          <p:cNvPr id="4" name="标题 1"/>
-          <p:cNvSpPr txBox="1">
-            <a:spLocks/>
-          </p:cNvSpPr>
-          <p:nvPr/>
-        </p:nvSpPr>
-        <p:spPr>
-          <a:xfrm>
-            <a:off x="4222750" y="1162050"/>
-            <a:ext cx="3907748" cy="146050"/>
-          </a:xfrm>
-          <a:prstGeom prst="rect">
-            <a:avLst/>
-          </a:prstGeom>
-          <a:solidFill>
-            <a:srgbClr val="6F0E6F"/>
-          </a:solidFill>
-        </p:spPr>
-        <p:txBody>
-          <a:bodyPr vert="horz" lIns="91440" tIns="45720" rIns="91440" bIns="45720" rtlCol="0" anchor="ctr">
-            <a:normAutofit fontScale="25000" lnSpcReduction="20000"/>
-          </a:bodyPr>
-          <a:lstStyle>
-            <a:lvl1pPr algn="ctr" defTabSz="685800" rtl="0" eaLnBrk="1" latinLnBrk="0" hangingPunct="1">
-              <a:lnSpc>
-                <a:spcPct val="90000"/>
-              </a:lnSpc>
-              <a:spcBef>
-                <a:spcPct val="0"/>
-              </a:spcBef>
-              <a:buNone/>
-              <a:defRPr sz="2700" b="1" kern="1200">
-                <a:solidFill>
-                  <a:srgbClr val="6F0E6F"/>
-                </a:solidFill>
-                <a:latin typeface="微软雅黑" panose="020B0503020204020204" pitchFamily="34" charset="-122"/>
-                <a:ea typeface="微软雅黑" panose="020B0503020204020204" pitchFamily="34" charset="-122"/>
-                <a:cs typeface="+mj-cs"/>
-              </a:defRPr>
-            </a:lvl1pPr>
-          </a:lstStyle>
-          <a:p>
-            <a:endParaRPr lang="zh-CN" altLang="en-US" sz="3200" dirty="0">
-              <a:solidFill>
-                <a:schemeClr val="bg1"/>
-              </a:solidFill>
-            </a:endParaRPr>
-          </a:p>
-        </p:txBody>
-      </p:sp>
-      <p:sp>
-        <p:nvSpPr>
-          <p:cNvPr id="5" name="灯片编号占位符 4"/>
-          <p:cNvSpPr>
-            <a:spLocks noGrp="1"/>
-          </p:cNvSpPr>
-          <p:nvPr>
-            <p:ph type="sldNum" sz="quarter" idx="12"/>
-          </p:nvPr>
-        </p:nvSpPr>
-        <p:spPr/>
-        <p:txBody>
-          <a:bodyPr/>
-          <a:lstStyle/>
-          <a:p>
-            <a:fld id="{02AE1E35-F495-4665-8CB0-CDD28443F6EA}" type="slidenum">
-              <a:rPr lang="zh-CN" altLang="en-US" smtClean="0"/>
-              <a:t>2</a:t>
-            </a:fld>
-            <a:endParaRPr lang="zh-CN" altLang="en-US"/>
-          </a:p>
-        </p:txBody>
-      </p:sp>
-    </p:spTree>
-    <p:extLst>
-      <p:ext uri="{BB962C8B-B14F-4D97-AF65-F5344CB8AC3E}">
-        <p14:creationId xmlns:p14="http://schemas.microsoft.com/office/powerpoint/2010/main" val="2385772990"/>
-      </p:ext>
-    </p:extLst>
-  </p:cSld>
-  <p:clrMapOvr>
-    <a:masterClrMapping/>
-  </p:clrMapOvr>
-</p:sld>
-</file>
-
-<file path=ppt/slides/slide20.xml><?xml version="1.0" encoding="utf-8"?>
-<p:sld xmlns:a="http://schemas.openxmlformats.org/drawingml/2006/main" xmlns:r="http://schemas.openxmlformats.org/officeDocument/2006/relationships" xmlns:p="http://schemas.openxmlformats.org/presentationml/2006/main">
-  <p:cSld>
-    <p:spTree>
-      <p:nvGrpSpPr>
-        <p:cNvPr id="1" name=""/>
-        <p:cNvGrpSpPr/>
-        <p:nvPr/>
-      </p:nvGrpSpPr>
-      <p:grpSpPr>
-        <a:xfrm>
-          <a:off x="0" y="0"/>
-          <a:ext cx="0" cy="0"/>
-          <a:chOff x="0" y="0"/>
-          <a:chExt cx="0" cy="0"/>
-        </a:xfrm>
-      </p:grpSpPr>
-      <p:sp>
-        <p:nvSpPr>
-          <p:cNvPr id="2" name="标题 1"/>
-          <p:cNvSpPr>
-            <a:spLocks noGrp="1"/>
-          </p:cNvSpPr>
-          <p:nvPr>
-            <p:ph type="title"/>
-          </p:nvPr>
-        </p:nvSpPr>
-        <p:spPr>
-          <a:xfrm>
             <a:off x="420454" y="287306"/>
             <a:ext cx="8301515" cy="649110"/>
           </a:xfrm>
@@ -14413,7 +14735,7 @@
           <a:p>
             <a:fld id="{02AE1E35-F495-4665-8CB0-CDD28443F6EA}" type="slidenum">
               <a:rPr lang="zh-CN" altLang="en-US" smtClean="0"/>
-              <a:t>20</a:t>
+              <a:t>22</a:t>
             </a:fld>
             <a:endParaRPr lang="zh-CN" altLang="en-US"/>
           </a:p>
@@ -14462,328 +14784,6 @@
 </p:sld>
 </file>
 
-<file path=ppt/slides/slide21.xml><?xml version="1.0" encoding="utf-8"?>
-<p:sld xmlns:a="http://schemas.openxmlformats.org/drawingml/2006/main" xmlns:r="http://schemas.openxmlformats.org/officeDocument/2006/relationships" xmlns:p="http://schemas.openxmlformats.org/presentationml/2006/main">
-  <p:cSld>
-    <p:spTree>
-      <p:nvGrpSpPr>
-        <p:cNvPr id="1" name=""/>
-        <p:cNvGrpSpPr/>
-        <p:nvPr/>
-      </p:nvGrpSpPr>
-      <p:grpSpPr>
-        <a:xfrm>
-          <a:off x="0" y="0"/>
-          <a:ext cx="0" cy="0"/>
-          <a:chOff x="0" y="0"/>
-          <a:chExt cx="0" cy="0"/>
-        </a:xfrm>
-      </p:grpSpPr>
-      <p:sp>
-        <p:nvSpPr>
-          <p:cNvPr id="2" name="标题 1"/>
-          <p:cNvSpPr>
-            <a:spLocks noGrp="1"/>
-          </p:cNvSpPr>
-          <p:nvPr>
-            <p:ph type="title"/>
-          </p:nvPr>
-        </p:nvSpPr>
-        <p:spPr>
-          <a:xfrm>
-            <a:off x="420454" y="287306"/>
-            <a:ext cx="8301515" cy="649110"/>
-          </a:xfrm>
-        </p:spPr>
-        <p:txBody>
-          <a:bodyPr/>
-          <a:lstStyle/>
-          <a:p>
-            <a:r>
-              <a:rPr lang="en-US" altLang="zh-CN" dirty="0"/>
-              <a:t>IV.</a:t>
-            </a:r>
-            <a:r>
-              <a:rPr lang="zh-CN" altLang="en-US" dirty="0"/>
-              <a:t> 流计算步骤</a:t>
-            </a:r>
-            <a:r>
-              <a:rPr lang="en-US" altLang="zh-CN" dirty="0"/>
-              <a:t>——</a:t>
-            </a:r>
-            <a:r>
-              <a:rPr lang="zh-CN" altLang="en-US" dirty="0"/>
-              <a:t>问题和解决方案</a:t>
-            </a:r>
-          </a:p>
-        </p:txBody>
-      </p:sp>
-      <p:sp>
-        <p:nvSpPr>
-          <p:cNvPr id="3" name="内容占位符 2"/>
-          <p:cNvSpPr>
-            <a:spLocks noGrp="1"/>
-          </p:cNvSpPr>
-          <p:nvPr>
-            <p:ph idx="1"/>
-          </p:nvPr>
-        </p:nvSpPr>
-        <p:spPr>
-          <a:xfrm>
-            <a:off x="420456" y="1188138"/>
-            <a:ext cx="8570478" cy="5096838"/>
-          </a:xfrm>
-        </p:spPr>
-        <p:txBody>
-          <a:bodyPr>
-            <a:normAutofit/>
-          </a:bodyPr>
-          <a:lstStyle/>
-          <a:p>
-            <a:pPr lvl="0"/>
-            <a:r>
-              <a:rPr lang="zh-CN" altLang="en-US" dirty="0">
-                <a:solidFill>
-                  <a:prstClr val="black"/>
-                </a:solidFill>
-              </a:rPr>
-              <a:t>流的一键启动</a:t>
-            </a:r>
-            <a:endParaRPr lang="en-US" altLang="zh-CN" dirty="0">
-              <a:solidFill>
-                <a:prstClr val="black"/>
-              </a:solidFill>
-            </a:endParaRPr>
-          </a:p>
-        </p:txBody>
-      </p:sp>
-      <p:sp>
-        <p:nvSpPr>
-          <p:cNvPr id="5" name="灯片编号占位符 4"/>
-          <p:cNvSpPr>
-            <a:spLocks noGrp="1"/>
-          </p:cNvSpPr>
-          <p:nvPr>
-            <p:ph type="sldNum" sz="quarter" idx="12"/>
-          </p:nvPr>
-        </p:nvSpPr>
-        <p:spPr/>
-        <p:txBody>
-          <a:bodyPr/>
-          <a:lstStyle/>
-          <a:p>
-            <a:fld id="{02AE1E35-F495-4665-8CB0-CDD28443F6EA}" type="slidenum">
-              <a:rPr lang="zh-CN" altLang="en-US" smtClean="0"/>
-              <a:t>21</a:t>
-            </a:fld>
-            <a:endParaRPr lang="zh-CN" altLang="en-US"/>
-          </a:p>
-        </p:txBody>
-      </p:sp>
-      <p:pic>
-        <p:nvPicPr>
-          <p:cNvPr id="4" name="图片 3">
-            <a:extLst>
-              <a:ext uri="{FF2B5EF4-FFF2-40B4-BE49-F238E27FC236}">
-                <a16:creationId xmlns:a16="http://schemas.microsoft.com/office/drawing/2014/main" id="{B0664363-B11F-4A42-A659-6F9640C09D73}"/>
-              </a:ext>
-            </a:extLst>
-          </p:cNvPr>
-          <p:cNvPicPr>
-            <a:picLocks noChangeAspect="1"/>
-          </p:cNvPicPr>
-          <p:nvPr/>
-        </p:nvPicPr>
-        <p:blipFill>
-          <a:blip r:embed="rId3"/>
-          <a:stretch>
-            <a:fillRect/>
-          </a:stretch>
-        </p:blipFill>
-        <p:spPr>
-          <a:xfrm>
-            <a:off x="899175" y="1964753"/>
-            <a:ext cx="7613040" cy="3543607"/>
-          </a:xfrm>
-          <a:prstGeom prst="rect">
-            <a:avLst/>
-          </a:prstGeom>
-        </p:spPr>
-      </p:pic>
-    </p:spTree>
-    <p:extLst>
-      <p:ext uri="{BB962C8B-B14F-4D97-AF65-F5344CB8AC3E}">
-        <p14:creationId xmlns:p14="http://schemas.microsoft.com/office/powerpoint/2010/main" val="4154761658"/>
-      </p:ext>
-    </p:extLst>
-  </p:cSld>
-  <p:clrMapOvr>
-    <a:masterClrMapping/>
-  </p:clrMapOvr>
-</p:sld>
-</file>
-
-<file path=ppt/slides/slide22.xml><?xml version="1.0" encoding="utf-8"?>
-<p:sld xmlns:a="http://schemas.openxmlformats.org/drawingml/2006/main" xmlns:r="http://schemas.openxmlformats.org/officeDocument/2006/relationships" xmlns:p="http://schemas.openxmlformats.org/presentationml/2006/main">
-  <p:cSld>
-    <p:spTree>
-      <p:nvGrpSpPr>
-        <p:cNvPr id="1" name=""/>
-        <p:cNvGrpSpPr/>
-        <p:nvPr/>
-      </p:nvGrpSpPr>
-      <p:grpSpPr>
-        <a:xfrm>
-          <a:off x="0" y="0"/>
-          <a:ext cx="0" cy="0"/>
-          <a:chOff x="0" y="0"/>
-          <a:chExt cx="0" cy="0"/>
-        </a:xfrm>
-      </p:grpSpPr>
-      <p:sp>
-        <p:nvSpPr>
-          <p:cNvPr id="2" name="标题 1"/>
-          <p:cNvSpPr>
-            <a:spLocks noGrp="1"/>
-          </p:cNvSpPr>
-          <p:nvPr>
-            <p:ph type="title"/>
-          </p:nvPr>
-        </p:nvSpPr>
-        <p:spPr>
-          <a:xfrm>
-            <a:off x="420454" y="287306"/>
-            <a:ext cx="8301515" cy="649110"/>
-          </a:xfrm>
-        </p:spPr>
-        <p:txBody>
-          <a:bodyPr/>
-          <a:lstStyle/>
-          <a:p>
-            <a:r>
-              <a:rPr lang="en-US" altLang="zh-CN" dirty="0"/>
-              <a:t>IV.</a:t>
-            </a:r>
-            <a:r>
-              <a:rPr lang="zh-CN" altLang="en-US" dirty="0"/>
-              <a:t> 流计算步骤</a:t>
-            </a:r>
-            <a:r>
-              <a:rPr lang="en-US" altLang="zh-CN" dirty="0"/>
-              <a:t>——</a:t>
-            </a:r>
-            <a:r>
-              <a:rPr lang="zh-CN" altLang="en-US" dirty="0"/>
-              <a:t>问题和解决方案</a:t>
-            </a:r>
-          </a:p>
-        </p:txBody>
-      </p:sp>
-      <p:sp>
-        <p:nvSpPr>
-          <p:cNvPr id="3" name="内容占位符 2"/>
-          <p:cNvSpPr>
-            <a:spLocks noGrp="1"/>
-          </p:cNvSpPr>
-          <p:nvPr>
-            <p:ph idx="1"/>
-          </p:nvPr>
-        </p:nvSpPr>
-        <p:spPr>
-          <a:xfrm>
-            <a:off x="420456" y="1188138"/>
-            <a:ext cx="8570478" cy="5096838"/>
-          </a:xfrm>
-        </p:spPr>
-        <p:txBody>
-          <a:bodyPr>
-            <a:normAutofit/>
-          </a:bodyPr>
-          <a:lstStyle/>
-          <a:p>
-            <a:pPr lvl="0"/>
-            <a:r>
-              <a:rPr lang="zh-CN" altLang="en-US" dirty="0">
-                <a:solidFill>
-                  <a:prstClr val="black"/>
-                </a:solidFill>
-              </a:rPr>
-              <a:t>流的一键启动</a:t>
-            </a:r>
-            <a:endParaRPr lang="en-US" altLang="zh-CN" dirty="0">
-              <a:solidFill>
-                <a:prstClr val="black"/>
-              </a:solidFill>
-            </a:endParaRPr>
-          </a:p>
-        </p:txBody>
-      </p:sp>
-      <p:sp>
-        <p:nvSpPr>
-          <p:cNvPr id="5" name="灯片编号占位符 4"/>
-          <p:cNvSpPr>
-            <a:spLocks noGrp="1"/>
-          </p:cNvSpPr>
-          <p:nvPr>
-            <p:ph type="sldNum" sz="quarter" idx="12"/>
-          </p:nvPr>
-        </p:nvSpPr>
-        <p:spPr/>
-        <p:txBody>
-          <a:bodyPr/>
-          <a:lstStyle/>
-          <a:p>
-            <a:fld id="{02AE1E35-F495-4665-8CB0-CDD28443F6EA}" type="slidenum">
-              <a:rPr lang="zh-CN" altLang="en-US" smtClean="0"/>
-              <a:t>22</a:t>
-            </a:fld>
-            <a:endParaRPr lang="zh-CN" altLang="en-US"/>
-          </a:p>
-        </p:txBody>
-      </p:sp>
-      <p:pic>
-        <p:nvPicPr>
-          <p:cNvPr id="6" name="图片 5">
-            <a:extLst>
-              <a:ext uri="{FF2B5EF4-FFF2-40B4-BE49-F238E27FC236}">
-                <a16:creationId xmlns:a16="http://schemas.microsoft.com/office/drawing/2014/main" id="{5803D64A-2679-4406-BEF1-E259E3E019E3}"/>
-              </a:ext>
-            </a:extLst>
-          </p:cNvPr>
-          <p:cNvPicPr>
-            <a:picLocks noChangeAspect="1"/>
-          </p:cNvPicPr>
-          <p:nvPr/>
-        </p:nvPicPr>
-        <p:blipFill>
-          <a:blip r:embed="rId3"/>
-          <a:stretch>
-            <a:fillRect/>
-          </a:stretch>
-        </p:blipFill>
-        <p:spPr>
-          <a:xfrm>
-            <a:off x="959976" y="2132408"/>
-            <a:ext cx="7658764" cy="3208298"/>
-          </a:xfrm>
-          <a:prstGeom prst="rect">
-            <a:avLst/>
-          </a:prstGeom>
-        </p:spPr>
-      </p:pic>
-    </p:spTree>
-    <p:extLst>
-      <p:ext uri="{BB962C8B-B14F-4D97-AF65-F5344CB8AC3E}">
-        <p14:creationId xmlns:p14="http://schemas.microsoft.com/office/powerpoint/2010/main" val="1157749109"/>
-      </p:ext>
-    </p:extLst>
-  </p:cSld>
-  <p:clrMapOvr>
-    <a:masterClrMapping/>
-  </p:clrMapOvr>
-</p:sld>
-</file>
-
 <file path=ppt/slides/slide23.xml><?xml version="1.0" encoding="utf-8"?>
 <p:sld xmlns:a="http://schemas.openxmlformats.org/drawingml/2006/main" xmlns:r="http://schemas.openxmlformats.org/officeDocument/2006/relationships" xmlns:p="http://schemas.openxmlformats.org/presentationml/2006/main">
   <p:cSld>
@@ -14888,10 +14888,10 @@
       </p:sp>
       <p:pic>
         <p:nvPicPr>
-          <p:cNvPr id="6" name="图片 5">
+          <p:cNvPr id="7" name="图片 6">
             <a:extLst>
               <a:ext uri="{FF2B5EF4-FFF2-40B4-BE49-F238E27FC236}">
-                <a16:creationId xmlns:a16="http://schemas.microsoft.com/office/drawing/2014/main" id="{5936616F-B9FE-4E2A-9E5C-F07A71297042}"/>
+                <a16:creationId xmlns:a16="http://schemas.microsoft.com/office/drawing/2014/main" id="{C074F83F-FBCD-427A-8B70-B143464E0490}"/>
               </a:ext>
             </a:extLst>
           </p:cNvPr>
@@ -14901,7 +14901,7 @@
           <p:nvPr/>
         </p:nvPicPr>
         <p:blipFill>
-          <a:blip r:embed="rId3" cstate="print">
+          <a:blip r:embed="rId3">
             <a:extLst>
               <a:ext uri="{28A0092B-C50C-407E-A947-70E740481C1C}">
                 <a14:useLocalDpi xmlns:a14="http://schemas.microsoft.com/office/drawing/2010/main" val="0"/>
@@ -14914,8 +14914,8 @@
         </p:blipFill>
         <p:spPr>
           <a:xfrm>
-            <a:off x="529230" y="1602819"/>
-            <a:ext cx="8083962" cy="4523169"/>
+            <a:off x="289040" y="1595187"/>
+            <a:ext cx="8064708" cy="4511196"/>
           </a:xfrm>
           <a:prstGeom prst="rect">
             <a:avLst/>
@@ -15040,10 +15040,10 @@
       </p:sp>
       <p:pic>
         <p:nvPicPr>
-          <p:cNvPr id="7" name="图片 6">
+          <p:cNvPr id="6" name="图片 5">
             <a:extLst>
               <a:ext uri="{FF2B5EF4-FFF2-40B4-BE49-F238E27FC236}">
-                <a16:creationId xmlns:a16="http://schemas.microsoft.com/office/drawing/2014/main" id="{60D71007-0614-432E-A02D-2E8A4BA2CE80}"/>
+                <a16:creationId xmlns:a16="http://schemas.microsoft.com/office/drawing/2014/main" id="{7067F870-E9D1-4501-80AD-C96E2EE2BAA0}"/>
               </a:ext>
             </a:extLst>
           </p:cNvPr>
@@ -15053,7 +15053,7 @@
           <p:nvPr/>
         </p:nvPicPr>
         <p:blipFill>
-          <a:blip r:embed="rId3" cstate="print">
+          <a:blip r:embed="rId3">
             <a:extLst>
               <a:ext uri="{28A0092B-C50C-407E-A947-70E740481C1C}">
                 <a14:useLocalDpi xmlns:a14="http://schemas.microsoft.com/office/drawing/2010/main" val="0"/>
@@ -15066,8 +15066,8 @@
         </p:blipFill>
         <p:spPr>
           <a:xfrm>
-            <a:off x="512730" y="1573024"/>
-            <a:ext cx="8301514" cy="4644895"/>
+            <a:off x="502170" y="1747539"/>
+            <a:ext cx="8301514" cy="4637174"/>
           </a:xfrm>
           <a:prstGeom prst="rect">
             <a:avLst/>
@@ -15193,10 +15193,10 @@
       </p:sp>
       <p:pic>
         <p:nvPicPr>
-          <p:cNvPr id="6" name="Picture 5">
+          <p:cNvPr id="7" name="图片 6">
             <a:extLst>
               <a:ext uri="{FF2B5EF4-FFF2-40B4-BE49-F238E27FC236}">
-                <a16:creationId xmlns:a16="http://schemas.microsoft.com/office/drawing/2014/main" id="{E6DF3D6D-3A85-7F4D-AEF3-B9F4B864A158}"/>
+                <a16:creationId xmlns:a16="http://schemas.microsoft.com/office/drawing/2014/main" id="{A2171FD3-80FE-4BD0-9DD8-C39976993495}"/>
               </a:ext>
             </a:extLst>
           </p:cNvPr>
@@ -15219,8 +15219,44 @@
         </p:blipFill>
         <p:spPr>
           <a:xfrm>
-            <a:off x="738554" y="1867702"/>
-            <a:ext cx="7666891" cy="4260025"/>
+            <a:off x="942187" y="1894110"/>
+            <a:ext cx="3676531" cy="4303489"/>
+          </a:xfrm>
+          <a:prstGeom prst="rect">
+            <a:avLst/>
+          </a:prstGeom>
+        </p:spPr>
+      </p:pic>
+      <p:pic>
+        <p:nvPicPr>
+          <p:cNvPr id="9" name="图片 8">
+            <a:extLst>
+              <a:ext uri="{FF2B5EF4-FFF2-40B4-BE49-F238E27FC236}">
+                <a16:creationId xmlns:a16="http://schemas.microsoft.com/office/drawing/2014/main" id="{94DD9463-1885-46D1-93FE-C0432E64753F}"/>
+              </a:ext>
+            </a:extLst>
+          </p:cNvPr>
+          <p:cNvPicPr>
+            <a:picLocks noChangeAspect="1"/>
+          </p:cNvPicPr>
+          <p:nvPr/>
+        </p:nvPicPr>
+        <p:blipFill>
+          <a:blip r:embed="rId4" cstate="print">
+            <a:extLst>
+              <a:ext uri="{28A0092B-C50C-407E-A947-70E740481C1C}">
+                <a14:useLocalDpi xmlns:a14="http://schemas.microsoft.com/office/drawing/2010/main" val="0"/>
+              </a:ext>
+            </a:extLst>
+          </a:blip>
+          <a:stretch>
+            <a:fillRect/>
+          </a:stretch>
+        </p:blipFill>
+        <p:spPr>
+          <a:xfrm>
+            <a:off x="4618718" y="1894110"/>
+            <a:ext cx="3688704" cy="4303489"/>
           </a:xfrm>
           <a:prstGeom prst="rect">
             <a:avLst/>
@@ -15359,10 +15395,10 @@
       </p:sp>
       <p:pic>
         <p:nvPicPr>
-          <p:cNvPr id="7" name="图片 6">
+          <p:cNvPr id="6" name="图片 5">
             <a:extLst>
               <a:ext uri="{FF2B5EF4-FFF2-40B4-BE49-F238E27FC236}">
-                <a16:creationId xmlns:a16="http://schemas.microsoft.com/office/drawing/2014/main" id="{599C4A7A-4DAF-4E10-AE93-415C3363BC1A}"/>
+                <a16:creationId xmlns:a16="http://schemas.microsoft.com/office/drawing/2014/main" id="{94D7D161-7A67-4C0C-AE71-A4BF19541EE7}"/>
               </a:ext>
             </a:extLst>
           </p:cNvPr>
@@ -15372,7 +15408,7 @@
           <p:nvPr/>
         </p:nvPicPr>
         <p:blipFill>
-          <a:blip r:embed="rId3" cstate="print">
+          <a:blip r:embed="rId3">
             <a:extLst>
               <a:ext uri="{28A0092B-C50C-407E-A947-70E740481C1C}">
                 <a14:useLocalDpi xmlns:a14="http://schemas.microsoft.com/office/drawing/2010/main" val="0"/>
@@ -15385,8 +15421,8 @@
         </p:blipFill>
         <p:spPr>
           <a:xfrm>
-            <a:off x="966063" y="2097022"/>
-            <a:ext cx="7210295" cy="4030040"/>
+            <a:off x="943591" y="2012605"/>
+            <a:ext cx="7255239" cy="4052731"/>
           </a:xfrm>
           <a:prstGeom prst="rect">
             <a:avLst/>

</xml_diff>